<commit_message>
Update link to code
</commit_message>
<xml_diff>
--- a/Week05.pptx
+++ b/Week05.pptx
@@ -206,7 +206,7 @@
   <pc:docChgLst>
     <pc:chgData name="tanaboon tongbuasirilai" userId="3a6fbbe2-a5cd-4f36-96f1-1e3cf3325333" providerId="ADAL" clId="{90A24C15-C441-4DFB-9114-781CAE773D2F}"/>
     <pc:docChg chg="custSel modSld">
-      <pc:chgData name="tanaboon tongbuasirilai" userId="3a6fbbe2-a5cd-4f36-96f1-1e3cf3325333" providerId="ADAL" clId="{90A24C15-C441-4DFB-9114-781CAE773D2F}" dt="2024-07-26T04:52:01.070" v="361" actId="20577"/>
+      <pc:chgData name="tanaboon tongbuasirilai" userId="3a6fbbe2-a5cd-4f36-96f1-1e3cf3325333" providerId="ADAL" clId="{90A24C15-C441-4DFB-9114-781CAE773D2F}" dt="2024-07-26T06:19:17.569" v="362"/>
       <pc:docMkLst>
         <pc:docMk/>
       </pc:docMkLst>
@@ -282,6 +282,21 @@
           <pc:docMk/>
           <pc:sldMk cId="2559242256" sldId="269"/>
         </pc:sldMkLst>
+      </pc:sldChg>
+      <pc:sldChg chg="modSp mod">
+        <pc:chgData name="tanaboon tongbuasirilai" userId="3a6fbbe2-a5cd-4f36-96f1-1e3cf3325333" providerId="ADAL" clId="{90A24C15-C441-4DFB-9114-781CAE773D2F}" dt="2024-07-26T06:19:17.569" v="362"/>
+        <pc:sldMkLst>
+          <pc:docMk/>
+          <pc:sldMk cId="2366643805" sldId="295"/>
+        </pc:sldMkLst>
+        <pc:spChg chg="mod">
+          <ac:chgData name="tanaboon tongbuasirilai" userId="3a6fbbe2-a5cd-4f36-96f1-1e3cf3325333" providerId="ADAL" clId="{90A24C15-C441-4DFB-9114-781CAE773D2F}" dt="2024-07-26T06:19:17.569" v="362"/>
+          <ac:spMkLst>
+            <pc:docMk/>
+            <pc:sldMk cId="2366643805" sldId="295"/>
+            <ac:spMk id="3" creationId="{EC1091DB-8022-3264-11F9-5ABECB797C1B}"/>
+          </ac:spMkLst>
+        </pc:spChg>
       </pc:sldChg>
     </pc:docChg>
   </pc:docChgLst>
@@ -682,23 +697,7 @@
           <a:bodyPr/>
           <a:lstStyle/>
           <a:p>
-            <a:r>
-              <a:rPr lang="th-TH" dirty="0"/>
-              <a:t>อธิบาย </a:t>
-            </a:r>
-            <a:r>
-              <a:rPr lang="en-US" dirty="0"/>
-              <a:t>recursive call of </a:t>
-            </a:r>
-            <a:r>
-              <a:rPr lang="en-US" dirty="0" err="1"/>
-              <a:t>compute_scattering</a:t>
-            </a:r>
-            <a:r>
-              <a:rPr lang="en-US" dirty="0"/>
-              <a:t>()</a:t>
-            </a:r>
-            <a:endParaRPr lang="th-TH" dirty="0"/>
+            <a:endParaRPr lang="th-TH"/>
           </a:p>
         </p:txBody>
       </p:sp>
@@ -719,7 +718,7 @@
           <a:p>
             <a:fld id="{8ECE3FA2-0A7E-4D17-8003-477DAD892FEE}" type="slidenum">
               <a:rPr lang="th-TH" smtClean="0"/>
-              <a:t>4</a:t>
+              <a:t>2</a:t>
             </a:fld>
             <a:endParaRPr lang="th-TH"/>
           </a:p>
@@ -728,7 +727,7 @@
     </p:spTree>
     <p:extLst>
       <p:ext uri="{BB962C8B-B14F-4D97-AF65-F5344CB8AC3E}">
-        <p14:creationId xmlns:p14="http://schemas.microsoft.com/office/powerpoint/2010/main" val="1018037099"/>
+        <p14:creationId xmlns:p14="http://schemas.microsoft.com/office/powerpoint/2010/main" val="208408399"/>
       </p:ext>
     </p:extLst>
   </p:cSld>
@@ -783,24 +782,20 @@
           <a:lstStyle/>
           <a:p>
             <a:r>
-              <a:rPr lang="en-US" dirty="0"/>
-              <a:t>Background color </a:t>
+              <a:rPr lang="th-TH" dirty="0"/>
+              <a:t>อธิบาย </a:t>
             </a:r>
             <a:r>
-              <a:rPr lang="th-TH" dirty="0"/>
-              <a:t>สีเดียวกัน ?</a:t>
+              <a:rPr lang="en-US" dirty="0"/>
+              <a:t>recursive call of </a:t>
             </a:r>
-          </a:p>
-          <a:p>
+            <a:r>
+              <a:rPr lang="en-US" dirty="0" err="1"/>
+              <a:t>compute_scattering</a:t>
+            </a:r>
             <a:r>
               <a:rPr lang="en-US" dirty="0"/>
-              <a:t>Optical illusion</a:t>
-            </a:r>
-          </a:p>
-          <a:p>
-            <a:r>
-              <a:rPr lang="en-US" dirty="0"/>
-              <a:t>Why noisy ?</a:t>
+              <a:t>()</a:t>
             </a:r>
             <a:endParaRPr lang="th-TH" dirty="0"/>
           </a:p>
@@ -823,7 +818,7 @@
           <a:p>
             <a:fld id="{8ECE3FA2-0A7E-4D17-8003-477DAD892FEE}" type="slidenum">
               <a:rPr lang="th-TH" smtClean="0"/>
-              <a:t>5</a:t>
+              <a:t>4</a:t>
             </a:fld>
             <a:endParaRPr lang="th-TH"/>
           </a:p>
@@ -832,7 +827,7 @@
     </p:spTree>
     <p:extLst>
       <p:ext uri="{BB962C8B-B14F-4D97-AF65-F5344CB8AC3E}">
-        <p14:creationId xmlns:p14="http://schemas.microsoft.com/office/powerpoint/2010/main" val="3266528988"/>
+        <p14:creationId xmlns:p14="http://schemas.microsoft.com/office/powerpoint/2010/main" val="1018037099"/>
       </p:ext>
     </p:extLst>
   </p:cSld>
@@ -888,7 +883,23 @@
           <a:p>
             <a:r>
               <a:rPr lang="en-US" dirty="0"/>
-              <a:t>What effects do we obtain from each of the scattering behaviors ?</a:t>
+              <a:t>Background color </a:t>
+            </a:r>
+            <a:r>
+              <a:rPr lang="th-TH" dirty="0"/>
+              <a:t>สีเดียวกัน ?</a:t>
+            </a:r>
+          </a:p>
+          <a:p>
+            <a:r>
+              <a:rPr lang="en-US" dirty="0"/>
+              <a:t>Optical illusion</a:t>
+            </a:r>
+          </a:p>
+          <a:p>
+            <a:r>
+              <a:rPr lang="en-US" dirty="0"/>
+              <a:t>Why noisy ?</a:t>
             </a:r>
             <a:endParaRPr lang="th-TH" dirty="0"/>
           </a:p>
@@ -911,7 +922,7 @@
           <a:p>
             <a:fld id="{8ECE3FA2-0A7E-4D17-8003-477DAD892FEE}" type="slidenum">
               <a:rPr lang="th-TH" smtClean="0"/>
-              <a:t>6</a:t>
+              <a:t>5</a:t>
             </a:fld>
             <a:endParaRPr lang="th-TH"/>
           </a:p>
@@ -920,7 +931,7 @@
     </p:spTree>
     <p:extLst>
       <p:ext uri="{BB962C8B-B14F-4D97-AF65-F5344CB8AC3E}">
-        <p14:creationId xmlns:p14="http://schemas.microsoft.com/office/powerpoint/2010/main" val="1938563915"/>
+        <p14:creationId xmlns:p14="http://schemas.microsoft.com/office/powerpoint/2010/main" val="3266528988"/>
       </p:ext>
     </p:extLst>
   </p:cSld>
@@ -976,7 +987,7 @@
           <a:p>
             <a:r>
               <a:rPr lang="en-US" dirty="0"/>
-              <a:t>None is implemented in material scattering method previously.</a:t>
+              <a:t>What effects do we obtain from each of the scattering behaviors ?</a:t>
             </a:r>
             <a:endParaRPr lang="th-TH" dirty="0"/>
           </a:p>
@@ -999,7 +1010,7 @@
           <a:p>
             <a:fld id="{8ECE3FA2-0A7E-4D17-8003-477DAD892FEE}" type="slidenum">
               <a:rPr lang="th-TH" smtClean="0"/>
-              <a:t>7</a:t>
+              <a:t>6</a:t>
             </a:fld>
             <a:endParaRPr lang="th-TH"/>
           </a:p>
@@ -1008,7 +1019,7 @@
     </p:spTree>
     <p:extLst>
       <p:ext uri="{BB962C8B-B14F-4D97-AF65-F5344CB8AC3E}">
-        <p14:creationId xmlns:p14="http://schemas.microsoft.com/office/powerpoint/2010/main" val="484957364"/>
+        <p14:creationId xmlns:p14="http://schemas.microsoft.com/office/powerpoint/2010/main" val="1938563915"/>
       </p:ext>
     </p:extLst>
   </p:cSld>
@@ -1064,7 +1075,7 @@
           <a:p>
             <a:r>
               <a:rPr lang="en-US" dirty="0"/>
-              <a:t>What does it do ?</a:t>
+              <a:t>None is implemented in material scattering method previously.</a:t>
             </a:r>
             <a:endParaRPr lang="th-TH" dirty="0"/>
           </a:p>
@@ -1087,7 +1098,7 @@
           <a:p>
             <a:fld id="{8ECE3FA2-0A7E-4D17-8003-477DAD892FEE}" type="slidenum">
               <a:rPr lang="th-TH" smtClean="0"/>
-              <a:t>8</a:t>
+              <a:t>7</a:t>
             </a:fld>
             <a:endParaRPr lang="th-TH"/>
           </a:p>
@@ -1096,7 +1107,7 @@
     </p:spTree>
     <p:extLst>
       <p:ext uri="{BB962C8B-B14F-4D97-AF65-F5344CB8AC3E}">
-        <p14:creationId xmlns:p14="http://schemas.microsoft.com/office/powerpoint/2010/main" val="3686439282"/>
+        <p14:creationId xmlns:p14="http://schemas.microsoft.com/office/powerpoint/2010/main" val="484957364"/>
       </p:ext>
     </p:extLst>
   </p:cSld>
@@ -1152,6 +1163,94 @@
           <a:p>
             <a:r>
               <a:rPr lang="en-US" dirty="0"/>
+              <a:t>What does it do ?</a:t>
+            </a:r>
+            <a:endParaRPr lang="th-TH" dirty="0"/>
+          </a:p>
+        </p:txBody>
+      </p:sp>
+      <p:sp>
+        <p:nvSpPr>
+          <p:cNvPr id="4" name="Slide Number Placeholder 3"/>
+          <p:cNvSpPr>
+            <a:spLocks noGrp="1"/>
+          </p:cNvSpPr>
+          <p:nvPr>
+            <p:ph type="sldNum" sz="quarter" idx="5"/>
+          </p:nvPr>
+        </p:nvSpPr>
+        <p:spPr/>
+        <p:txBody>
+          <a:bodyPr/>
+          <a:lstStyle/>
+          <a:p>
+            <a:fld id="{8ECE3FA2-0A7E-4D17-8003-477DAD892FEE}" type="slidenum">
+              <a:rPr lang="th-TH" smtClean="0"/>
+              <a:t>8</a:t>
+            </a:fld>
+            <a:endParaRPr lang="th-TH"/>
+          </a:p>
+        </p:txBody>
+      </p:sp>
+    </p:spTree>
+    <p:extLst>
+      <p:ext uri="{BB962C8B-B14F-4D97-AF65-F5344CB8AC3E}">
+        <p14:creationId xmlns:p14="http://schemas.microsoft.com/office/powerpoint/2010/main" val="3686439282"/>
+      </p:ext>
+    </p:extLst>
+  </p:cSld>
+  <p:clrMapOvr>
+    <a:masterClrMapping/>
+  </p:clrMapOvr>
+</p:notes>
+</file>
+
+<file path=ppt/notesSlides/notesSlide7.xml><?xml version="1.0" encoding="utf-8"?>
+<p:notes xmlns:a="http://schemas.openxmlformats.org/drawingml/2006/main" xmlns:r="http://schemas.openxmlformats.org/officeDocument/2006/relationships" xmlns:p="http://schemas.openxmlformats.org/presentationml/2006/main">
+  <p:cSld>
+    <p:spTree>
+      <p:nvGrpSpPr>
+        <p:cNvPr id="1" name=""/>
+        <p:cNvGrpSpPr/>
+        <p:nvPr/>
+      </p:nvGrpSpPr>
+      <p:grpSpPr>
+        <a:xfrm>
+          <a:off x="0" y="0"/>
+          <a:ext cx="0" cy="0"/>
+          <a:chOff x="0" y="0"/>
+          <a:chExt cx="0" cy="0"/>
+        </a:xfrm>
+      </p:grpSpPr>
+      <p:sp>
+        <p:nvSpPr>
+          <p:cNvPr id="2" name="Slide Image Placeholder 1"/>
+          <p:cNvSpPr>
+            <a:spLocks noGrp="1" noRot="1" noChangeAspect="1"/>
+          </p:cNvSpPr>
+          <p:nvPr>
+            <p:ph type="sldImg"/>
+          </p:nvPr>
+        </p:nvSpPr>
+        <p:spPr/>
+      </p:sp>
+      <p:sp>
+        <p:nvSpPr>
+          <p:cNvPr id="3" name="Notes Placeholder 2"/>
+          <p:cNvSpPr>
+            <a:spLocks noGrp="1"/>
+          </p:cNvSpPr>
+          <p:nvPr>
+            <p:ph type="body" idx="1"/>
+          </p:nvPr>
+        </p:nvSpPr>
+        <p:spPr/>
+        <p:txBody>
+          <a:bodyPr/>
+          <a:lstStyle/>
+          <a:p>
+            <a:r>
+              <a:rPr lang="en-US" dirty="0"/>
               <a:t>Why do we need this ?</a:t>
             </a:r>
             <a:endParaRPr lang="th-TH" dirty="0"/>
@@ -1194,7 +1293,7 @@
 </p:notes>
 </file>
 
-<file path=ppt/notesSlides/notesSlide7.xml><?xml version="1.0" encoding="utf-8"?>
+<file path=ppt/notesSlides/notesSlide8.xml><?xml version="1.0" encoding="utf-8"?>
 <p:notes xmlns:a="http://schemas.openxmlformats.org/drawingml/2006/main" xmlns:r="http://schemas.openxmlformats.org/officeDocument/2006/relationships" xmlns:p="http://schemas.openxmlformats.org/presentationml/2006/main">
   <p:cSld>
     <p:spTree>
@@ -12297,7 +12396,7 @@
           <p:nvPr/>
         </p:nvPicPr>
         <p:blipFill>
-          <a:blip r:embed="rId2">
+          <a:blip r:embed="rId3">
             <a:extLst>
               <a:ext uri="{28A0092B-C50C-407E-A947-70E740481C1C}">
                 <a14:useLocalDpi xmlns:a14="http://schemas.microsoft.com/office/drawing/2010/main" val="0"/>
@@ -12403,7 +12502,7 @@
           <p:nvPr/>
         </p:nvPicPr>
         <p:blipFill>
-          <a:blip r:embed="rId3">
+          <a:blip r:embed="rId4">
             <a:extLst>
               <a:ext uri="{28A0092B-C50C-407E-A947-70E740481C1C}">
                 <a14:useLocalDpi xmlns:a14="http://schemas.microsoft.com/office/drawing/2010/main" val="0"/>
@@ -14207,19 +14306,7 @@
               <a:rPr lang="en-US" sz="2200" dirty="0">
                 <a:cs typeface="Calibri"/>
               </a:rPr>
-              <a:t>github.com/</a:t>
-            </a:r>
-            <a:r>
-              <a:rPr lang="en-US" sz="2200" dirty="0" err="1">
-                <a:cs typeface="Calibri"/>
-              </a:rPr>
-              <a:t>boonta</a:t>
-            </a:r>
-            <a:r>
-              <a:rPr lang="en-US" sz="2200" dirty="0">
-                <a:cs typeface="Calibri"/>
-              </a:rPr>
-              <a:t>/RT-python-week05</a:t>
+              <a:t>https://github.com/KUGA-01418283-Raytracing/RT-python-week05</a:t>
             </a:r>
           </a:p>
         </p:txBody>

</xml_diff>